<commit_message>
Fixed issues with index page of name ref
</commit_message>
<xml_diff>
--- a/Open day poster/After headphones watermark/poster display.pptx
+++ b/Open day poster/After headphones watermark/poster display.pptx
@@ -145,8 +145,8 @@
         <c:manualLayout>
           <c:xMode val="edge"/>
           <c:yMode val="edge"/>
-          <c:x val="0.14452601779439678"/>
-          <c:y val="2.0834876286051098E-2"/>
+          <c:x val="0.14452601779439686"/>
+          <c:y val="2.0834876286051119E-2"/>
         </c:manualLayout>
       </c:layout>
     </c:title>
@@ -306,12 +306,12 @@
           </c:val>
         </c:ser>
         <c:shape val="box"/>
-        <c:axId val="90640768"/>
-        <c:axId val="90642688"/>
+        <c:axId val="91511040"/>
+        <c:axId val="91521408"/>
         <c:axId val="0"/>
       </c:bar3DChart>
       <c:catAx>
-        <c:axId val="90640768"/>
+        <c:axId val="91511040"/>
         <c:scaling>
           <c:orientation val="minMax"/>
         </c:scaling>
@@ -346,14 +346,14 @@
             <a:endParaRPr lang="en-US"/>
           </a:p>
         </c:txPr>
-        <c:crossAx val="90642688"/>
+        <c:crossAx val="91521408"/>
         <c:crosses val="autoZero"/>
         <c:auto val="1"/>
         <c:lblAlgn val="ctr"/>
         <c:lblOffset val="100"/>
       </c:catAx>
       <c:valAx>
-        <c:axId val="90642688"/>
+        <c:axId val="91521408"/>
         <c:scaling>
           <c:orientation val="minMax"/>
         </c:scaling>
@@ -389,7 +389,7 @@
             <a:endParaRPr lang="en-US"/>
           </a:p>
         </c:txPr>
-        <c:crossAx val="90640768"/>
+        <c:crossAx val="91511040"/>
         <c:crosses val="autoZero"/>
         <c:crossBetween val="between"/>
       </c:valAx>
@@ -449,7 +449,7 @@
               <c:layout>
                 <c:manualLayout>
                   <c:x val="0.27605293041055495"/>
-                  <c:y val="0.11953027150275963"/>
+                  <c:y val="0.11953027150275969"/>
                 </c:manualLayout>
               </c:layout>
               <c:showCatName val="1"/>
@@ -565,7 +565,7 @@
           <c:xMode val="edge"/>
           <c:yMode val="edge"/>
           <c:x val="0.14205807506800189"/>
-          <c:y val="8.9121887287025012E-2"/>
+          <c:y val="8.9121887287025026E-2"/>
         </c:manualLayout>
       </c:layout>
     </c:title>
@@ -621,8 +621,8 @@
         <c:manualLayout>
           <c:xMode val="edge"/>
           <c:yMode val="edge"/>
-          <c:x val="0.11513428389018948"/>
-          <c:y val="2.3524559175266233E-2"/>
+          <c:x val="0.11513428389018956"/>
+          <c:y val="2.3524559175266219E-2"/>
         </c:manualLayout>
       </c:layout>
     </c:title>
@@ -732,7 +732,7 @@
           <c:xMode val="edge"/>
           <c:yMode val="edge"/>
           <c:x val="0.12208054061086078"/>
-          <c:y val="8.9635814801466956E-2"/>
+          <c:y val="8.963581480146704E-2"/>
         </c:manualLayout>
       </c:layout>
     </c:title>
@@ -948,12 +948,12 @@
         <c:gapWidth val="55"/>
         <c:gapDepth val="55"/>
         <c:shape val="box"/>
-        <c:axId val="85129472"/>
-        <c:axId val="85259392"/>
+        <c:axId val="91365760"/>
+        <c:axId val="91367296"/>
         <c:axId val="0"/>
       </c:bar3DChart>
       <c:catAx>
-        <c:axId val="85129472"/>
+        <c:axId val="91365760"/>
         <c:scaling>
           <c:orientation val="minMax"/>
         </c:scaling>
@@ -970,14 +970,14 @@
             <a:endParaRPr lang="en-US"/>
           </a:p>
         </c:txPr>
-        <c:crossAx val="85259392"/>
+        <c:crossAx val="91367296"/>
         <c:crosses val="autoZero"/>
         <c:auto val="1"/>
         <c:lblAlgn val="ctr"/>
         <c:lblOffset val="100"/>
       </c:catAx>
       <c:valAx>
-        <c:axId val="85259392"/>
+        <c:axId val="91367296"/>
         <c:scaling>
           <c:orientation val="minMax"/>
         </c:scaling>
@@ -996,7 +996,7 @@
             <a:endParaRPr lang="en-US"/>
           </a:p>
         </c:txPr>
-        <c:crossAx val="85129472"/>
+        <c:crossAx val="91365760"/>
         <c:crosses val="autoZero"/>
         <c:crossBetween val="between"/>
       </c:valAx>
@@ -1186,12 +1186,12 @@
         <c:gapWidth val="55"/>
         <c:gapDepth val="55"/>
         <c:shape val="box"/>
-        <c:axId val="85614592"/>
-        <c:axId val="85616896"/>
+        <c:axId val="91405696"/>
+        <c:axId val="91415680"/>
         <c:axId val="0"/>
       </c:bar3DChart>
       <c:catAx>
-        <c:axId val="85614592"/>
+        <c:axId val="91405696"/>
         <c:scaling>
           <c:orientation val="minMax"/>
         </c:scaling>
@@ -1208,14 +1208,14 @@
             <a:endParaRPr lang="en-US"/>
           </a:p>
         </c:txPr>
-        <c:crossAx val="85616896"/>
+        <c:crossAx val="91415680"/>
         <c:crosses val="autoZero"/>
         <c:auto val="1"/>
         <c:lblAlgn val="ctr"/>
         <c:lblOffset val="100"/>
       </c:catAx>
       <c:valAx>
-        <c:axId val="85616896"/>
+        <c:axId val="91415680"/>
         <c:scaling>
           <c:orientation val="minMax"/>
         </c:scaling>
@@ -1234,7 +1234,7 @@
             <a:endParaRPr lang="en-US"/>
           </a:p>
         </c:txPr>
-        <c:crossAx val="85614592"/>
+        <c:crossAx val="91405696"/>
         <c:crosses val="autoZero"/>
         <c:crossBetween val="between"/>
       </c:valAx>
@@ -1296,9 +1296,9 @@
           <c:xMode val="edge"/>
           <c:yMode val="edge"/>
           <c:x val="0.28345765434775438"/>
-          <c:y val="0.37759566678369078"/>
+          <c:y val="0.37759566678369094"/>
           <c:w val="0.65291566794737865"/>
-          <c:h val="0.44736696925623237"/>
+          <c:h val="0.44736696925623265"/>
         </c:manualLayout>
       </c:layout>
       <c:bar3DChart>
@@ -1457,12 +1457,12 @@
         <c:gapWidth val="55"/>
         <c:gapDepth val="55"/>
         <c:shape val="box"/>
-        <c:axId val="86791680"/>
-        <c:axId val="86844160"/>
+        <c:axId val="91445888"/>
+        <c:axId val="91455872"/>
         <c:axId val="0"/>
       </c:bar3DChart>
       <c:catAx>
-        <c:axId val="86791680"/>
+        <c:axId val="91445888"/>
         <c:scaling>
           <c:orientation val="minMax"/>
         </c:scaling>
@@ -1479,14 +1479,14 @@
             <a:endParaRPr lang="en-US"/>
           </a:p>
         </c:txPr>
-        <c:crossAx val="86844160"/>
+        <c:crossAx val="91455872"/>
         <c:crosses val="autoZero"/>
         <c:auto val="1"/>
         <c:lblAlgn val="ctr"/>
         <c:lblOffset val="100"/>
       </c:catAx>
       <c:valAx>
-        <c:axId val="86844160"/>
+        <c:axId val="91455872"/>
         <c:scaling>
           <c:orientation val="minMax"/>
         </c:scaling>
@@ -1505,7 +1505,7 @@
             <a:endParaRPr lang="en-US"/>
           </a:p>
         </c:txPr>
-        <c:crossAx val="86791680"/>
+        <c:crossAx val="91445888"/>
         <c:crosses val="autoZero"/>
         <c:crossBetween val="between"/>
       </c:valAx>
@@ -1662,12 +1662,12 @@
         <c:gapWidth val="55"/>
         <c:gapDepth val="55"/>
         <c:shape val="box"/>
-        <c:axId val="88305664"/>
-        <c:axId val="88307200"/>
+        <c:axId val="91481216"/>
+        <c:axId val="91482752"/>
         <c:axId val="0"/>
       </c:bar3DChart>
       <c:catAx>
-        <c:axId val="88305664"/>
+        <c:axId val="91481216"/>
         <c:scaling>
           <c:orientation val="minMax"/>
         </c:scaling>
@@ -1685,14 +1685,14 @@
             <a:endParaRPr lang="en-US"/>
           </a:p>
         </c:txPr>
-        <c:crossAx val="88307200"/>
+        <c:crossAx val="91482752"/>
         <c:crosses val="autoZero"/>
         <c:auto val="1"/>
         <c:lblAlgn val="ctr"/>
         <c:lblOffset val="100"/>
       </c:catAx>
       <c:valAx>
-        <c:axId val="88307200"/>
+        <c:axId val="91482752"/>
         <c:scaling>
           <c:orientation val="minMax"/>
         </c:scaling>
@@ -1711,7 +1711,7 @@
             <a:endParaRPr lang="en-US"/>
           </a:p>
         </c:txPr>
-        <c:crossAx val="88305664"/>
+        <c:crossAx val="91481216"/>
         <c:crosses val="autoZero"/>
         <c:crossBetween val="between"/>
       </c:valAx>
@@ -1819,7 +1819,7 @@
             <a:fld id="{DB1E66FC-2998-4EEB-8BB3-1F4A6E48409A}" type="datetimeFigureOut">
               <a:rPr lang="en-US" smtClean="0"/>
               <a:pPr/>
-              <a:t>10/19/2011</a:t>
+              <a:t>10/20/2011</a:t>
             </a:fld>
             <a:endParaRPr lang="en-GB"/>
           </a:p>
@@ -2349,7 +2349,7 @@
             <a:fld id="{F68518BA-6EE0-4951-9D64-96CD5B83CBB1}" type="datetimeFigureOut">
               <a:rPr lang="en-US" smtClean="0"/>
               <a:pPr/>
-              <a:t>10/19/2011</a:t>
+              <a:t>10/20/2011</a:t>
             </a:fld>
             <a:endParaRPr lang="en-GB"/>
           </a:p>
@@ -2516,7 +2516,7 @@
             <a:fld id="{F68518BA-6EE0-4951-9D64-96CD5B83CBB1}" type="datetimeFigureOut">
               <a:rPr lang="en-US" smtClean="0"/>
               <a:pPr/>
-              <a:t>10/19/2011</a:t>
+              <a:t>10/20/2011</a:t>
             </a:fld>
             <a:endParaRPr lang="en-GB"/>
           </a:p>
@@ -2693,7 +2693,7 @@
             <a:fld id="{F68518BA-6EE0-4951-9D64-96CD5B83CBB1}" type="datetimeFigureOut">
               <a:rPr lang="en-US" smtClean="0"/>
               <a:pPr/>
-              <a:t>10/19/2011</a:t>
+              <a:t>10/20/2011</a:t>
             </a:fld>
             <a:endParaRPr lang="en-GB"/>
           </a:p>
@@ -2860,7 +2860,7 @@
             <a:fld id="{F68518BA-6EE0-4951-9D64-96CD5B83CBB1}" type="datetimeFigureOut">
               <a:rPr lang="en-US" smtClean="0"/>
               <a:pPr/>
-              <a:t>10/19/2011</a:t>
+              <a:t>10/20/2011</a:t>
             </a:fld>
             <a:endParaRPr lang="en-GB"/>
           </a:p>
@@ -3103,7 +3103,7 @@
             <a:fld id="{F68518BA-6EE0-4951-9D64-96CD5B83CBB1}" type="datetimeFigureOut">
               <a:rPr lang="en-US" smtClean="0"/>
               <a:pPr/>
-              <a:t>10/19/2011</a:t>
+              <a:t>10/20/2011</a:t>
             </a:fld>
             <a:endParaRPr lang="en-GB"/>
           </a:p>
@@ -3388,7 +3388,7 @@
             <a:fld id="{F68518BA-6EE0-4951-9D64-96CD5B83CBB1}" type="datetimeFigureOut">
               <a:rPr lang="en-US" smtClean="0"/>
               <a:pPr/>
-              <a:t>10/19/2011</a:t>
+              <a:t>10/20/2011</a:t>
             </a:fld>
             <a:endParaRPr lang="en-GB"/>
           </a:p>
@@ -3812,7 +3812,7 @@
             <a:fld id="{F68518BA-6EE0-4951-9D64-96CD5B83CBB1}" type="datetimeFigureOut">
               <a:rPr lang="en-US" smtClean="0"/>
               <a:pPr/>
-              <a:t>10/19/2011</a:t>
+              <a:t>10/20/2011</a:t>
             </a:fld>
             <a:endParaRPr lang="en-GB"/>
           </a:p>
@@ -3927,7 +3927,7 @@
             <a:fld id="{F68518BA-6EE0-4951-9D64-96CD5B83CBB1}" type="datetimeFigureOut">
               <a:rPr lang="en-US" smtClean="0"/>
               <a:pPr/>
-              <a:t>10/19/2011</a:t>
+              <a:t>10/20/2011</a:t>
             </a:fld>
             <a:endParaRPr lang="en-GB"/>
           </a:p>
@@ -4019,7 +4019,7 @@
             <a:fld id="{F68518BA-6EE0-4951-9D64-96CD5B83CBB1}" type="datetimeFigureOut">
               <a:rPr lang="en-US" smtClean="0"/>
               <a:pPr/>
-              <a:t>10/19/2011</a:t>
+              <a:t>10/20/2011</a:t>
             </a:fld>
             <a:endParaRPr lang="en-GB"/>
           </a:p>
@@ -4293,7 +4293,7 @@
             <a:fld id="{F68518BA-6EE0-4951-9D64-96CD5B83CBB1}" type="datetimeFigureOut">
               <a:rPr lang="en-US" smtClean="0"/>
               <a:pPr/>
-              <a:t>10/19/2011</a:t>
+              <a:t>10/20/2011</a:t>
             </a:fld>
             <a:endParaRPr lang="en-GB"/>
           </a:p>
@@ -4543,7 +4543,7 @@
             <a:fld id="{F68518BA-6EE0-4951-9D64-96CD5B83CBB1}" type="datetimeFigureOut">
               <a:rPr lang="en-US" smtClean="0"/>
               <a:pPr/>
-              <a:t>10/19/2011</a:t>
+              <a:t>10/20/2011</a:t>
             </a:fld>
             <a:endParaRPr lang="en-GB"/>
           </a:p>
@@ -4753,7 +4753,7 @@
             <a:fld id="{F68518BA-6EE0-4951-9D64-96CD5B83CBB1}" type="datetimeFigureOut">
               <a:rPr lang="en-US" smtClean="0"/>
               <a:pPr/>
-              <a:t>10/19/2011</a:t>
+              <a:t>10/20/2011</a:t>
             </a:fld>
             <a:endParaRPr lang="en-GB"/>
           </a:p>
@@ -5126,6 +5126,375 @@
       </p:grpSpPr>
       <p:sp>
         <p:nvSpPr>
+          <p:cNvPr id="84" name="Block Arc 83"/>
+          <p:cNvSpPr/>
+          <p:nvPr/>
+        </p:nvSpPr>
+        <p:spPr>
+          <a:xfrm rot="16444794">
+            <a:off x="3546037" y="7512754"/>
+            <a:ext cx="11858591" cy="4023360"/>
+          </a:xfrm>
+          <a:prstGeom prst="blockArc">
+            <a:avLst>
+              <a:gd name="adj1" fmla="val 10748422"/>
+              <a:gd name="adj2" fmla="val 48654"/>
+              <a:gd name="adj3" fmla="val 19128"/>
+            </a:avLst>
+          </a:prstGeom>
+          <a:solidFill>
+            <a:schemeClr val="bg1">
+              <a:lumMod val="95000"/>
+              <a:alpha val="80000"/>
+            </a:schemeClr>
+          </a:solidFill>
+          <a:ln>
+            <a:noFill/>
+          </a:ln>
+        </p:spPr>
+        <p:style>
+          <a:lnRef idx="2">
+            <a:schemeClr val="accent1">
+              <a:shade val="50000"/>
+            </a:schemeClr>
+          </a:lnRef>
+          <a:fillRef idx="1">
+            <a:schemeClr val="accent1"/>
+          </a:fillRef>
+          <a:effectRef idx="0">
+            <a:schemeClr val="accent1"/>
+          </a:effectRef>
+          <a:fontRef idx="minor">
+            <a:schemeClr val="lt1"/>
+          </a:fontRef>
+        </p:style>
+        <p:txBody>
+          <a:bodyPr rtlCol="0" anchor="ctr"/>
+          <a:lstStyle/>
+          <a:p>
+            <a:pPr algn="ctr"/>
+            <a:endParaRPr lang="en-GB">
+              <a:solidFill>
+                <a:schemeClr val="tx1"/>
+              </a:solidFill>
+            </a:endParaRPr>
+          </a:p>
+        </p:txBody>
+      </p:sp>
+      <p:sp>
+        <p:nvSpPr>
+          <p:cNvPr id="68" name="TextBox 67"/>
+          <p:cNvSpPr txBox="1"/>
+          <p:nvPr/>
+        </p:nvSpPr>
+        <p:spPr>
+          <a:xfrm>
+            <a:off x="1504950" y="5048405"/>
+            <a:ext cx="8515350" cy="7478970"/>
+          </a:xfrm>
+          <a:prstGeom prst="rect">
+            <a:avLst/>
+          </a:prstGeom>
+          <a:noFill/>
+          <a:ln w="63500">
+            <a:solidFill>
+              <a:schemeClr val="tx1"/>
+            </a:solidFill>
+          </a:ln>
+        </p:spPr>
+        <p:txBody>
+          <a:bodyPr wrap="square" rtlCol="0">
+            <a:spAutoFit/>
+          </a:bodyPr>
+          <a:lstStyle/>
+          <a:p>
+            <a:pPr algn="just"/>
+            <a:r>
+              <a:rPr lang="en-ZA" sz="2000" dirty="0" smtClean="0">
+                <a:latin typeface="Bookman Old Style" pitchFamily="18" charset="0"/>
+              </a:rPr>
+              <a:t>An investigation was undertaken to determine methods which can be employed to improve the usability of computers by the elderly.</a:t>
+            </a:r>
+            <a:r>
+              <a:rPr lang="en-GB" sz="2000" dirty="0" smtClean="0">
+                <a:latin typeface="Bookman Old Style" pitchFamily="18" charset="0"/>
+              </a:rPr>
+              <a:t> </a:t>
+            </a:r>
+            <a:r>
+              <a:rPr lang="en-ZA" sz="2000" dirty="0" smtClean="0">
+                <a:latin typeface="Bookman Old Style" pitchFamily="18" charset="0"/>
+              </a:rPr>
+              <a:t>The investigation narrowed down the scope of computer usage to web-browsing. The techniques required to make web-browsing simpler can be extrapolated from tasks which make computers more usable for the elderly in general.</a:t>
+            </a:r>
+            <a:r>
+              <a:rPr lang="en-GB" sz="2000" dirty="0" smtClean="0">
+                <a:latin typeface="Bookman Old Style" pitchFamily="18" charset="0"/>
+              </a:rPr>
+              <a:t> </a:t>
+            </a:r>
+            <a:r>
+              <a:rPr lang="en-ZA" sz="2000" dirty="0" smtClean="0">
+                <a:latin typeface="Bookman Old Style" pitchFamily="18" charset="0"/>
+              </a:rPr>
+              <a:t>Voice recognition was perceived as one of these tasks. Thus methods of voice referencing and visual annotations were specifically investigated.</a:t>
+            </a:r>
+          </a:p>
+          <a:p>
+            <a:pPr algn="just"/>
+            <a:endParaRPr lang="en-ZA" sz="2000" dirty="0" smtClean="0">
+              <a:latin typeface="Bookman Old Style" pitchFamily="18" charset="0"/>
+            </a:endParaRPr>
+          </a:p>
+          <a:p>
+            <a:pPr algn="just"/>
+            <a:r>
+              <a:rPr lang="en-ZA" sz="2000" b="1" dirty="0" smtClean="0">
+                <a:latin typeface="Bookman Old Style" pitchFamily="18" charset="0"/>
+              </a:rPr>
+              <a:t>Primary aim:</a:t>
+            </a:r>
+            <a:endParaRPr lang="en-GB" sz="2000" b="1" dirty="0" smtClean="0">
+              <a:latin typeface="Bookman Old Style" pitchFamily="18" charset="0"/>
+            </a:endParaRPr>
+          </a:p>
+          <a:p>
+            <a:pPr algn="just"/>
+            <a:r>
+              <a:rPr lang="en-ZA" sz="2000" dirty="0" smtClean="0">
+                <a:latin typeface="Bookman Old Style" pitchFamily="18" charset="0"/>
+              </a:rPr>
+              <a:t>Determine which of the two voice referencing techniques perform better as a means of referencing links (accuracy). The referencing  techniques are:</a:t>
+            </a:r>
+            <a:endParaRPr lang="en-GB" sz="2000" dirty="0" smtClean="0">
+              <a:latin typeface="Bookman Old Style" pitchFamily="18" charset="0"/>
+            </a:endParaRPr>
+          </a:p>
+          <a:p>
+            <a:pPr algn="just">
+              <a:buFont typeface="Arial" pitchFamily="34" charset="0"/>
+              <a:buChar char="•"/>
+            </a:pPr>
+            <a:r>
+              <a:rPr lang="en-GB" sz="2000" dirty="0" smtClean="0">
+                <a:latin typeface="Bookman Old Style" pitchFamily="18" charset="0"/>
+              </a:rPr>
+              <a:t> </a:t>
+            </a:r>
+            <a:r>
+              <a:rPr lang="en-ZA" sz="2000" i="1" dirty="0" smtClean="0">
+                <a:latin typeface="Bookman Old Style" pitchFamily="18" charset="0"/>
+              </a:rPr>
+              <a:t>Numerical voice referencing: </a:t>
+            </a:r>
+            <a:r>
+              <a:rPr lang="en-ZA" sz="2000" dirty="0" smtClean="0">
+                <a:latin typeface="Bookman Old Style" pitchFamily="18" charset="0"/>
+              </a:rPr>
+              <a:t>Assigning a sequential number to </a:t>
+            </a:r>
+          </a:p>
+          <a:p>
+            <a:pPr algn="just"/>
+            <a:r>
+              <a:rPr lang="en-ZA" sz="2000" dirty="0" smtClean="0">
+                <a:latin typeface="Bookman Old Style" pitchFamily="18" charset="0"/>
+              </a:rPr>
+              <a:t>  each link on a page and allowing users to access links by saying</a:t>
+            </a:r>
+          </a:p>
+          <a:p>
+            <a:pPr algn="just"/>
+            <a:r>
+              <a:rPr lang="en-ZA" sz="2000" dirty="0" smtClean="0">
+                <a:latin typeface="Bookman Old Style" pitchFamily="18" charset="0"/>
+              </a:rPr>
+              <a:t>  specific numbers.</a:t>
+            </a:r>
+            <a:endParaRPr lang="en-GB" sz="2000" dirty="0" smtClean="0">
+              <a:latin typeface="Bookman Old Style" pitchFamily="18" charset="0"/>
+            </a:endParaRPr>
+          </a:p>
+          <a:p>
+            <a:pPr algn="just">
+              <a:buFont typeface="Arial" pitchFamily="34" charset="0"/>
+              <a:buChar char="•"/>
+            </a:pPr>
+            <a:r>
+              <a:rPr lang="en-GB" sz="2000" dirty="0" smtClean="0">
+                <a:latin typeface="Bookman Old Style" pitchFamily="18" charset="0"/>
+              </a:rPr>
+              <a:t> </a:t>
+            </a:r>
+            <a:r>
+              <a:rPr lang="en-ZA" sz="2000" i="1" dirty="0" smtClean="0">
+                <a:latin typeface="Bookman Old Style" pitchFamily="18" charset="0"/>
+              </a:rPr>
+              <a:t>Spoken link name referencing: </a:t>
+            </a:r>
+            <a:r>
+              <a:rPr lang="en-ZA" sz="2000" dirty="0" smtClean="0">
+                <a:latin typeface="Bookman Old Style" pitchFamily="18" charset="0"/>
+              </a:rPr>
+              <a:t>Links are referenced by  a specified </a:t>
+            </a:r>
+          </a:p>
+          <a:p>
+            <a:pPr algn="just"/>
+            <a:r>
+              <a:rPr lang="en-ZA" sz="2000" dirty="0" smtClean="0">
+                <a:latin typeface="Bookman Old Style" pitchFamily="18" charset="0"/>
+              </a:rPr>
+              <a:t>  word within the link name.</a:t>
+            </a:r>
+            <a:endParaRPr lang="en-GB" sz="2000" dirty="0" smtClean="0">
+              <a:latin typeface="Bookman Old Style" pitchFamily="18" charset="0"/>
+            </a:endParaRPr>
+          </a:p>
+          <a:p>
+            <a:pPr algn="just"/>
+            <a:r>
+              <a:rPr lang="en-ZA" sz="2000" dirty="0" smtClean="0">
+                <a:latin typeface="Bookman Old Style" pitchFamily="18" charset="0"/>
+              </a:rPr>
+              <a:t>In addition, determine which technique is predominantly  preferred by users.</a:t>
+            </a:r>
+          </a:p>
+          <a:p>
+            <a:pPr algn="just">
+              <a:buFont typeface="Arial" pitchFamily="34" charset="0"/>
+              <a:buChar char="•"/>
+            </a:pPr>
+            <a:endParaRPr lang="en-GB" sz="2000" dirty="0" smtClean="0">
+              <a:latin typeface="Bookman Old Style" pitchFamily="18" charset="0"/>
+            </a:endParaRPr>
+          </a:p>
+          <a:p>
+            <a:pPr algn="just"/>
+            <a:r>
+              <a:rPr lang="en-ZA" sz="2000" b="1" dirty="0" smtClean="0">
+                <a:latin typeface="Bookman Old Style" pitchFamily="18" charset="0"/>
+              </a:rPr>
+              <a:t>Secondary aim: </a:t>
+            </a:r>
+            <a:endParaRPr lang="en-GB" sz="2000" b="1" dirty="0" smtClean="0">
+              <a:latin typeface="Bookman Old Style" pitchFamily="18" charset="0"/>
+            </a:endParaRPr>
+          </a:p>
+          <a:p>
+            <a:pPr algn="just"/>
+            <a:r>
+              <a:rPr lang="en-ZA" sz="2000" dirty="0" smtClean="0">
+                <a:latin typeface="Bookman Old Style" pitchFamily="18" charset="0"/>
+              </a:rPr>
+              <a:t>Determine what types of visual techniques can be used to improve the usability of the internet.</a:t>
+            </a:r>
+            <a:endParaRPr lang="en-GB" sz="2000" dirty="0" smtClean="0">
+              <a:latin typeface="Bookman Old Style" pitchFamily="18" charset="0"/>
+            </a:endParaRPr>
+          </a:p>
+        </p:txBody>
+      </p:sp>
+      <p:sp>
+        <p:nvSpPr>
+          <p:cNvPr id="85" name="Rectangle 84"/>
+          <p:cNvSpPr/>
+          <p:nvPr/>
+        </p:nvSpPr>
+        <p:spPr>
+          <a:xfrm rot="1089615">
+            <a:off x="18359013" y="16791697"/>
+            <a:ext cx="7050683" cy="667958"/>
+          </a:xfrm>
+          <a:prstGeom prst="rect">
+            <a:avLst/>
+          </a:prstGeom>
+          <a:solidFill>
+            <a:schemeClr val="bg1">
+              <a:lumMod val="95000"/>
+              <a:alpha val="70000"/>
+            </a:schemeClr>
+          </a:solidFill>
+          <a:ln>
+            <a:noFill/>
+          </a:ln>
+        </p:spPr>
+        <p:style>
+          <a:lnRef idx="2">
+            <a:schemeClr val="accent1">
+              <a:shade val="50000"/>
+            </a:schemeClr>
+          </a:lnRef>
+          <a:fillRef idx="1">
+            <a:schemeClr val="accent1"/>
+          </a:fillRef>
+          <a:effectRef idx="0">
+            <a:schemeClr val="accent1"/>
+          </a:effectRef>
+          <a:fontRef idx="minor">
+            <a:schemeClr val="lt1"/>
+          </a:fontRef>
+        </p:style>
+        <p:txBody>
+          <a:bodyPr rtlCol="0" anchor="ctr"/>
+          <a:lstStyle/>
+          <a:p>
+            <a:pPr algn="ctr"/>
+            <a:endParaRPr lang="en-GB"/>
+          </a:p>
+        </p:txBody>
+      </p:sp>
+      <p:sp>
+        <p:nvSpPr>
+          <p:cNvPr id="88" name="Oval 87"/>
+          <p:cNvSpPr/>
+          <p:nvPr/>
+        </p:nvSpPr>
+        <p:spPr>
+          <a:xfrm rot="1114632">
+            <a:off x="24094439" y="17373601"/>
+            <a:ext cx="2697480" cy="1920240"/>
+          </a:xfrm>
+          <a:prstGeom prst="ellipse">
+            <a:avLst/>
+          </a:prstGeom>
+          <a:solidFill>
+            <a:schemeClr val="bg1">
+              <a:lumMod val="95000"/>
+              <a:alpha val="70000"/>
+            </a:schemeClr>
+          </a:solidFill>
+          <a:ln>
+            <a:noFill/>
+          </a:ln>
+        </p:spPr>
+        <p:style>
+          <a:lnRef idx="2">
+            <a:schemeClr val="accent1">
+              <a:shade val="50000"/>
+            </a:schemeClr>
+          </a:lnRef>
+          <a:fillRef idx="1">
+            <a:schemeClr val="accent1"/>
+          </a:fillRef>
+          <a:effectRef idx="0">
+            <a:schemeClr val="accent1"/>
+          </a:effectRef>
+          <a:fontRef idx="minor">
+            <a:schemeClr val="lt1"/>
+          </a:fontRef>
+        </p:style>
+        <p:txBody>
+          <a:bodyPr rtlCol="0" anchor="ctr"/>
+          <a:lstStyle/>
+          <a:p>
+            <a:pPr algn="ctr"/>
+            <a:endParaRPr lang="en-GB"/>
+          </a:p>
+        </p:txBody>
+      </p:sp>
+      <p:sp>
+        <p:nvSpPr>
           <p:cNvPr id="82" name="Block Arc 81"/>
           <p:cNvSpPr/>
           <p:nvPr/>
@@ -5240,112 +5609,6 @@
       </p:sp>
       <p:sp>
         <p:nvSpPr>
-          <p:cNvPr id="84" name="Block Arc 83"/>
-          <p:cNvSpPr/>
-          <p:nvPr/>
-        </p:nvSpPr>
-        <p:spPr>
-          <a:xfrm rot="16444794">
-            <a:off x="3546037" y="7512754"/>
-            <a:ext cx="11858591" cy="4023360"/>
-          </a:xfrm>
-          <a:prstGeom prst="blockArc">
-            <a:avLst>
-              <a:gd name="adj1" fmla="val 10748422"/>
-              <a:gd name="adj2" fmla="val 48654"/>
-              <a:gd name="adj3" fmla="val 19128"/>
-            </a:avLst>
-          </a:prstGeom>
-          <a:solidFill>
-            <a:schemeClr val="bg1">
-              <a:lumMod val="95000"/>
-              <a:alpha val="80000"/>
-            </a:schemeClr>
-          </a:solidFill>
-          <a:ln>
-            <a:noFill/>
-          </a:ln>
-        </p:spPr>
-        <p:style>
-          <a:lnRef idx="2">
-            <a:schemeClr val="accent1">
-              <a:shade val="50000"/>
-            </a:schemeClr>
-          </a:lnRef>
-          <a:fillRef idx="1">
-            <a:schemeClr val="accent1"/>
-          </a:fillRef>
-          <a:effectRef idx="0">
-            <a:schemeClr val="accent1"/>
-          </a:effectRef>
-          <a:fontRef idx="minor">
-            <a:schemeClr val="lt1"/>
-          </a:fontRef>
-        </p:style>
-        <p:txBody>
-          <a:bodyPr rtlCol="0" anchor="ctr"/>
-          <a:lstStyle/>
-          <a:p>
-            <a:pPr algn="ctr"/>
-            <a:endParaRPr lang="en-GB">
-              <a:solidFill>
-                <a:schemeClr val="tx1"/>
-              </a:solidFill>
-            </a:endParaRPr>
-          </a:p>
-        </p:txBody>
-      </p:sp>
-      <p:sp>
-        <p:nvSpPr>
-          <p:cNvPr id="85" name="Rectangle 84"/>
-          <p:cNvSpPr/>
-          <p:nvPr/>
-        </p:nvSpPr>
-        <p:spPr>
-          <a:xfrm rot="1089615">
-            <a:off x="18176133" y="17157457"/>
-            <a:ext cx="7050683" cy="667958"/>
-          </a:xfrm>
-          <a:prstGeom prst="rect">
-            <a:avLst/>
-          </a:prstGeom>
-          <a:solidFill>
-            <a:schemeClr val="bg1">
-              <a:lumMod val="95000"/>
-              <a:alpha val="70000"/>
-            </a:schemeClr>
-          </a:solidFill>
-          <a:ln>
-            <a:noFill/>
-          </a:ln>
-        </p:spPr>
-        <p:style>
-          <a:lnRef idx="2">
-            <a:schemeClr val="accent1">
-              <a:shade val="50000"/>
-            </a:schemeClr>
-          </a:lnRef>
-          <a:fillRef idx="1">
-            <a:schemeClr val="accent1"/>
-          </a:fillRef>
-          <a:effectRef idx="0">
-            <a:schemeClr val="accent1"/>
-          </a:effectRef>
-          <a:fontRef idx="minor">
-            <a:schemeClr val="lt1"/>
-          </a:fontRef>
-        </p:style>
-        <p:txBody>
-          <a:bodyPr rtlCol="0" anchor="ctr"/>
-          <a:lstStyle/>
-          <a:p>
-            <a:pPr algn="ctr"/>
-            <a:endParaRPr lang="en-GB"/>
-          </a:p>
-        </p:txBody>
-      </p:sp>
-      <p:sp>
-        <p:nvSpPr>
           <p:cNvPr id="86" name="Oval 85"/>
           <p:cNvSpPr/>
           <p:nvPr/>
@@ -5444,55 +5707,6 @@
       </p:sp>
       <p:sp>
         <p:nvSpPr>
-          <p:cNvPr id="88" name="Oval 87"/>
-          <p:cNvSpPr/>
-          <p:nvPr/>
-        </p:nvSpPr>
-        <p:spPr>
-          <a:xfrm rot="1114632">
-            <a:off x="23682959" y="17556481"/>
-            <a:ext cx="2697480" cy="1920240"/>
-          </a:xfrm>
-          <a:prstGeom prst="ellipse">
-            <a:avLst/>
-          </a:prstGeom>
-          <a:solidFill>
-            <a:schemeClr val="bg1">
-              <a:lumMod val="95000"/>
-              <a:alpha val="70000"/>
-            </a:schemeClr>
-          </a:solidFill>
-          <a:ln>
-            <a:noFill/>
-          </a:ln>
-        </p:spPr>
-        <p:style>
-          <a:lnRef idx="2">
-            <a:schemeClr val="accent1">
-              <a:shade val="50000"/>
-            </a:schemeClr>
-          </a:lnRef>
-          <a:fillRef idx="1">
-            <a:schemeClr val="accent1"/>
-          </a:fillRef>
-          <a:effectRef idx="0">
-            <a:schemeClr val="accent1"/>
-          </a:effectRef>
-          <a:fontRef idx="minor">
-            <a:schemeClr val="lt1"/>
-          </a:fontRef>
-        </p:style>
-        <p:txBody>
-          <a:bodyPr rtlCol="0" anchor="ctr"/>
-          <a:lstStyle/>
-          <a:p>
-            <a:pPr algn="ctr"/>
-            <a:endParaRPr lang="en-GB"/>
-          </a:p>
-        </p:txBody>
-      </p:sp>
-      <p:sp>
-        <p:nvSpPr>
           <p:cNvPr id="89" name="Block Arc 88"/>
           <p:cNvSpPr/>
           <p:nvPr/>
@@ -5720,9 +5934,6 @@
               </a:rPr>
               <a:t> 67% of the users would prefer an application that does not </a:t>
             </a:r>
-            <a:endParaRPr lang="en-GB" sz="2000" dirty="0" smtClean="0">
-              <a:latin typeface="Bookman Old Style" pitchFamily="18" charset="0"/>
-            </a:endParaRPr>
           </a:p>
           <a:p>
             <a:pPr lvl="0" algn="just"/>
@@ -5730,37 +5941,7 @@
               <a:rPr lang="en-GB" sz="2000" dirty="0" smtClean="0">
                 <a:latin typeface="Bookman Old Style" pitchFamily="18" charset="0"/>
               </a:rPr>
-              <a:t> </a:t>
-            </a:r>
-            <a:r>
-              <a:rPr lang="en-GB" sz="2000" dirty="0" smtClean="0">
-                <a:latin typeface="Bookman Old Style" pitchFamily="18" charset="0"/>
-              </a:rPr>
-              <a:t> </a:t>
-            </a:r>
-            <a:r>
-              <a:rPr lang="en-GB" sz="2000" dirty="0" smtClean="0">
-                <a:latin typeface="Bookman Old Style" pitchFamily="18" charset="0"/>
-              </a:rPr>
-              <a:t>require </a:t>
-            </a:r>
-            <a:r>
-              <a:rPr lang="en-GB" sz="2000" dirty="0" smtClean="0">
-                <a:latin typeface="Bookman Old Style" pitchFamily="18" charset="0"/>
-              </a:rPr>
-              <a:t> </a:t>
-            </a:r>
-            <a:r>
-              <a:rPr lang="en-GB" sz="2000" dirty="0" smtClean="0">
-                <a:latin typeface="Bookman Old Style" pitchFamily="18" charset="0"/>
-              </a:rPr>
-              <a:t>internet </a:t>
-            </a:r>
-            <a:r>
-              <a:rPr lang="en-GB" sz="2000" dirty="0" smtClean="0">
-                <a:latin typeface="Bookman Old Style" pitchFamily="18" charset="0"/>
-              </a:rPr>
-              <a:t>access. </a:t>
+              <a:t>  require  internet access. </a:t>
             </a:r>
           </a:p>
         </p:txBody>
@@ -5869,53 +6050,6 @@
               </a:rPr>
               <a:t> </a:t>
             </a:r>
-          </a:p>
-        </p:txBody>
-      </p:sp>
-      <p:sp>
-        <p:nvSpPr>
-          <p:cNvPr id="4" name="TextBox 3"/>
-          <p:cNvSpPr txBox="1"/>
-          <p:nvPr/>
-        </p:nvSpPr>
-        <p:spPr>
-          <a:xfrm>
-            <a:off x="4060159" y="1006448"/>
-            <a:ext cx="21804347" cy="2554545"/>
-          </a:xfrm>
-          <a:prstGeom prst="rect">
-            <a:avLst/>
-          </a:prstGeom>
-          <a:noFill/>
-          <a:ln w="25400" cap="sq" cmpd="sng">
-            <a:noFill/>
-          </a:ln>
-          <a:effectLst>
-            <a:outerShdw blurRad="50800" dist="50800" dir="5400000" algn="ctr" rotWithShape="0">
-              <a:schemeClr val="bg1"/>
-            </a:outerShdw>
-          </a:effectLst>
-        </p:spPr>
-        <p:txBody>
-          <a:bodyPr wrap="square" rtlCol="0">
-            <a:spAutoFit/>
-          </a:bodyPr>
-          <a:lstStyle/>
-          <a:p>
-            <a:pPr algn="ctr"/>
-            <a:r>
-              <a:rPr lang="en-ZA" sz="8000" b="1" dirty="0" smtClean="0">
-                <a:latin typeface="Verdana" pitchFamily="34" charset="0"/>
-                <a:ea typeface="Verdana" pitchFamily="34" charset="0"/>
-                <a:cs typeface="Verdana" pitchFamily="34" charset="0"/>
-              </a:rPr>
-              <a:t>An investigation into voice-controlled web browsing for the elderly</a:t>
-            </a:r>
-            <a:endParaRPr lang="en-GB" sz="8000" b="1" dirty="0">
-              <a:latin typeface="Verdana" pitchFamily="34" charset="0"/>
-              <a:ea typeface="Verdana" pitchFamily="34" charset="0"/>
-              <a:cs typeface="Verdana" pitchFamily="34" charset="0"/>
-            </a:endParaRPr>
           </a:p>
         </p:txBody>
       </p:sp>
@@ -6138,96 +6272,6 @@
       </p:sp>
       <p:sp>
         <p:nvSpPr>
-          <p:cNvPr id="37" name="Rectangle 36"/>
-          <p:cNvSpPr/>
-          <p:nvPr/>
-        </p:nvSpPr>
-        <p:spPr>
-          <a:xfrm>
-            <a:off x="20256500" y="16822421"/>
-            <a:ext cx="8470900" cy="1016000"/>
-          </a:xfrm>
-          <a:prstGeom prst="rect">
-            <a:avLst/>
-          </a:prstGeom>
-          <a:solidFill>
-            <a:srgbClr val="00B050"/>
-          </a:solidFill>
-        </p:spPr>
-        <p:style>
-          <a:lnRef idx="2">
-            <a:schemeClr val="accent1">
-              <a:shade val="50000"/>
-            </a:schemeClr>
-          </a:lnRef>
-          <a:fillRef idx="1">
-            <a:schemeClr val="accent1"/>
-          </a:fillRef>
-          <a:effectRef idx="0">
-            <a:schemeClr val="accent1"/>
-          </a:effectRef>
-          <a:fontRef idx="minor">
-            <a:schemeClr val="lt1"/>
-          </a:fontRef>
-        </p:style>
-        <p:txBody>
-          <a:bodyPr rtlCol="0" anchor="ctr"/>
-          <a:lstStyle/>
-          <a:p>
-            <a:pPr algn="ctr"/>
-            <a:endParaRPr lang="en-GB"/>
-          </a:p>
-        </p:txBody>
-      </p:sp>
-      <p:sp>
-        <p:nvSpPr>
-          <p:cNvPr id="38" name="TextBox 37"/>
-          <p:cNvSpPr txBox="1"/>
-          <p:nvPr/>
-        </p:nvSpPr>
-        <p:spPr>
-          <a:xfrm>
-            <a:off x="20521627" y="16943411"/>
-            <a:ext cx="7927986" cy="769441"/>
-          </a:xfrm>
-          <a:prstGeom prst="rect">
-            <a:avLst/>
-          </a:prstGeom>
-          <a:solidFill>
-            <a:schemeClr val="tx1"/>
-          </a:solidFill>
-        </p:spPr>
-        <p:txBody>
-          <a:bodyPr wrap="square" rtlCol="0">
-            <a:spAutoFit/>
-          </a:bodyPr>
-          <a:lstStyle/>
-          <a:p>
-            <a:pPr algn="ctr"/>
-            <a:r>
-              <a:rPr lang="en-ZA" sz="4400" b="1" dirty="0" smtClean="0">
-                <a:solidFill>
-                  <a:schemeClr val="bg1"/>
-                </a:solidFill>
-                <a:latin typeface="Verdana" pitchFamily="34" charset="0"/>
-                <a:ea typeface="Verdana" pitchFamily="34" charset="0"/>
-                <a:cs typeface="Verdana" pitchFamily="34" charset="0"/>
-              </a:rPr>
-              <a:t>Conclusion</a:t>
-            </a:r>
-            <a:endParaRPr lang="en-GB" sz="4400" b="1" dirty="0">
-              <a:solidFill>
-                <a:schemeClr val="bg1"/>
-              </a:solidFill>
-              <a:latin typeface="Verdana" pitchFamily="34" charset="0"/>
-              <a:ea typeface="Verdana" pitchFamily="34" charset="0"/>
-              <a:cs typeface="Verdana" pitchFamily="34" charset="0"/>
-            </a:endParaRPr>
-          </a:p>
-        </p:txBody>
-      </p:sp>
-      <p:sp>
-        <p:nvSpPr>
           <p:cNvPr id="43" name="TextBox 42"/>
           <p:cNvSpPr txBox="1"/>
           <p:nvPr/>
@@ -7014,226 +7058,6 @@
           <a:effectLst/>
         </p:spPr>
       </p:pic>
-      <p:sp>
-        <p:nvSpPr>
-          <p:cNvPr id="68" name="TextBox 67"/>
-          <p:cNvSpPr txBox="1"/>
-          <p:nvPr/>
-        </p:nvSpPr>
-        <p:spPr>
-          <a:xfrm>
-            <a:off x="1504950" y="5048405"/>
-            <a:ext cx="8515350" cy="7478970"/>
-          </a:xfrm>
-          <a:prstGeom prst="rect">
-            <a:avLst/>
-          </a:prstGeom>
-          <a:noFill/>
-          <a:ln w="63500">
-            <a:solidFill>
-              <a:schemeClr val="tx1"/>
-            </a:solidFill>
-          </a:ln>
-        </p:spPr>
-        <p:txBody>
-          <a:bodyPr wrap="square" rtlCol="0">
-            <a:spAutoFit/>
-          </a:bodyPr>
-          <a:lstStyle/>
-          <a:p>
-            <a:pPr algn="just"/>
-            <a:r>
-              <a:rPr lang="en-ZA" sz="2000" dirty="0" smtClean="0">
-                <a:latin typeface="Bookman Old Style" pitchFamily="18" charset="0"/>
-              </a:rPr>
-              <a:t>An investigation was undertaken to determine methods which can be employed to improve the usability of computers by the elderly.</a:t>
-            </a:r>
-            <a:r>
-              <a:rPr lang="en-GB" sz="2000" dirty="0" smtClean="0">
-                <a:latin typeface="Bookman Old Style" pitchFamily="18" charset="0"/>
-              </a:rPr>
-              <a:t> </a:t>
-            </a:r>
-            <a:r>
-              <a:rPr lang="en-ZA" sz="2000" dirty="0" smtClean="0">
-                <a:latin typeface="Bookman Old Style" pitchFamily="18" charset="0"/>
-              </a:rPr>
-              <a:t>The investigation narrowed down the scope of computer usage to web-browsing. The techniques required to make web-browsing simpler can be extrapolated from tasks which make computers more usable for the elderly in general.</a:t>
-            </a:r>
-            <a:r>
-              <a:rPr lang="en-GB" sz="2000" dirty="0" smtClean="0">
-                <a:latin typeface="Bookman Old Style" pitchFamily="18" charset="0"/>
-              </a:rPr>
-              <a:t> </a:t>
-            </a:r>
-            <a:r>
-              <a:rPr lang="en-ZA" sz="2000" dirty="0" smtClean="0">
-                <a:latin typeface="Bookman Old Style" pitchFamily="18" charset="0"/>
-              </a:rPr>
-              <a:t>Voice recognition was perceived as one of these tasks. Thus methods of voice referencing and visual annotations were specifically investigated.</a:t>
-            </a:r>
-          </a:p>
-          <a:p>
-            <a:pPr algn="just"/>
-            <a:endParaRPr lang="en-ZA" sz="2000" dirty="0" smtClean="0">
-              <a:latin typeface="Bookman Old Style" pitchFamily="18" charset="0"/>
-            </a:endParaRPr>
-          </a:p>
-          <a:p>
-            <a:pPr algn="just"/>
-            <a:r>
-              <a:rPr lang="en-ZA" sz="2000" b="1" dirty="0" smtClean="0">
-                <a:latin typeface="Bookman Old Style" pitchFamily="18" charset="0"/>
-              </a:rPr>
-              <a:t>Primary aim:</a:t>
-            </a:r>
-            <a:endParaRPr lang="en-GB" sz="2000" b="1" dirty="0" smtClean="0">
-              <a:latin typeface="Bookman Old Style" pitchFamily="18" charset="0"/>
-            </a:endParaRPr>
-          </a:p>
-          <a:p>
-            <a:pPr algn="just"/>
-            <a:r>
-              <a:rPr lang="en-ZA" sz="2000" dirty="0" smtClean="0">
-                <a:latin typeface="Bookman Old Style" pitchFamily="18" charset="0"/>
-              </a:rPr>
-              <a:t>Determine which of the two voice referencing techniques perform better as a means of referencing links (accuracy). The referencing  techniques are:</a:t>
-            </a:r>
-            <a:endParaRPr lang="en-GB" sz="2000" dirty="0" smtClean="0">
-              <a:latin typeface="Bookman Old Style" pitchFamily="18" charset="0"/>
-            </a:endParaRPr>
-          </a:p>
-          <a:p>
-            <a:pPr algn="just">
-              <a:buFont typeface="Arial" pitchFamily="34" charset="0"/>
-              <a:buChar char="•"/>
-            </a:pPr>
-            <a:r>
-              <a:rPr lang="en-GB" sz="2000" dirty="0" smtClean="0">
-                <a:latin typeface="Bookman Old Style" pitchFamily="18" charset="0"/>
-              </a:rPr>
-              <a:t> </a:t>
-            </a:r>
-            <a:r>
-              <a:rPr lang="en-ZA" sz="2000" i="1" dirty="0" smtClean="0">
-                <a:latin typeface="Bookman Old Style" pitchFamily="18" charset="0"/>
-              </a:rPr>
-              <a:t>Numerical voice referencing: </a:t>
-            </a:r>
-            <a:r>
-              <a:rPr lang="en-ZA" sz="2000" dirty="0" smtClean="0">
-                <a:latin typeface="Bookman Old Style" pitchFamily="18" charset="0"/>
-              </a:rPr>
-              <a:t>Assigning a sequential number to </a:t>
-            </a:r>
-          </a:p>
-          <a:p>
-            <a:pPr algn="just"/>
-            <a:r>
-              <a:rPr lang="en-ZA" sz="2000" dirty="0" smtClean="0">
-                <a:latin typeface="Bookman Old Style" pitchFamily="18" charset="0"/>
-              </a:rPr>
-              <a:t>  each link on a page and allowing users to access links by saying</a:t>
-            </a:r>
-          </a:p>
-          <a:p>
-            <a:pPr algn="just"/>
-            <a:r>
-              <a:rPr lang="en-ZA" sz="2000" dirty="0" smtClean="0">
-                <a:latin typeface="Bookman Old Style" pitchFamily="18" charset="0"/>
-              </a:rPr>
-              <a:t>  specific numbers.</a:t>
-            </a:r>
-            <a:endParaRPr lang="en-GB" sz="2000" dirty="0" smtClean="0">
-              <a:latin typeface="Bookman Old Style" pitchFamily="18" charset="0"/>
-            </a:endParaRPr>
-          </a:p>
-          <a:p>
-            <a:pPr algn="just">
-              <a:buFont typeface="Arial" pitchFamily="34" charset="0"/>
-              <a:buChar char="•"/>
-            </a:pPr>
-            <a:r>
-              <a:rPr lang="en-GB" sz="2000" dirty="0" smtClean="0">
-                <a:latin typeface="Bookman Old Style" pitchFamily="18" charset="0"/>
-              </a:rPr>
-              <a:t> </a:t>
-            </a:r>
-            <a:r>
-              <a:rPr lang="en-ZA" sz="2000" i="1" dirty="0" smtClean="0">
-                <a:latin typeface="Bookman Old Style" pitchFamily="18" charset="0"/>
-              </a:rPr>
-              <a:t>Spoken link name referencing: </a:t>
-            </a:r>
-            <a:r>
-              <a:rPr lang="en-ZA" sz="2000" dirty="0" smtClean="0">
-                <a:latin typeface="Bookman Old Style" pitchFamily="18" charset="0"/>
-              </a:rPr>
-              <a:t>Links are referenced by  a specified </a:t>
-            </a:r>
-          </a:p>
-          <a:p>
-            <a:pPr algn="just"/>
-            <a:r>
-              <a:rPr lang="en-ZA" sz="2000" dirty="0" smtClean="0">
-                <a:latin typeface="Bookman Old Style" pitchFamily="18" charset="0"/>
-              </a:rPr>
-              <a:t>  word within the link name.</a:t>
-            </a:r>
-            <a:endParaRPr lang="en-GB" sz="2000" dirty="0" smtClean="0">
-              <a:latin typeface="Bookman Old Style" pitchFamily="18" charset="0"/>
-            </a:endParaRPr>
-          </a:p>
-          <a:p>
-            <a:pPr algn="just"/>
-            <a:r>
-              <a:rPr lang="en-ZA" sz="2000" dirty="0" smtClean="0">
-                <a:latin typeface="Bookman Old Style" pitchFamily="18" charset="0"/>
-              </a:rPr>
-              <a:t>In addition</a:t>
-            </a:r>
-            <a:r>
-              <a:rPr lang="en-ZA" sz="2000" dirty="0" smtClean="0">
-                <a:latin typeface="Bookman Old Style" pitchFamily="18" charset="0"/>
-              </a:rPr>
-              <a:t>, determine which technique is predominantly  preferred by users.</a:t>
-            </a:r>
-          </a:p>
-          <a:p>
-            <a:pPr algn="just">
-              <a:buFont typeface="Arial" pitchFamily="34" charset="0"/>
-              <a:buChar char="•"/>
-            </a:pPr>
-            <a:endParaRPr lang="en-GB" sz="2000" dirty="0" smtClean="0">
-              <a:latin typeface="Bookman Old Style" pitchFamily="18" charset="0"/>
-            </a:endParaRPr>
-          </a:p>
-          <a:p>
-            <a:pPr algn="just"/>
-            <a:r>
-              <a:rPr lang="en-ZA" sz="2000" b="1" dirty="0" smtClean="0">
-                <a:latin typeface="Bookman Old Style" pitchFamily="18" charset="0"/>
-              </a:rPr>
-              <a:t>Secondary aim: </a:t>
-            </a:r>
-            <a:endParaRPr lang="en-GB" sz="2000" b="1" dirty="0" smtClean="0">
-              <a:latin typeface="Bookman Old Style" pitchFamily="18" charset="0"/>
-            </a:endParaRPr>
-          </a:p>
-          <a:p>
-            <a:pPr algn="just"/>
-            <a:r>
-              <a:rPr lang="en-ZA" sz="2000" dirty="0" smtClean="0">
-                <a:latin typeface="Bookman Old Style" pitchFamily="18" charset="0"/>
-              </a:rPr>
-              <a:t>Determine what types of visual techniques can be used to improve the usability of the internet.</a:t>
-            </a:r>
-            <a:endParaRPr lang="en-GB" sz="2000" dirty="0" smtClean="0">
-              <a:latin typeface="Bookman Old Style" pitchFamily="18" charset="0"/>
-            </a:endParaRPr>
-          </a:p>
-        </p:txBody>
-      </p:sp>
       <p:graphicFrame>
         <p:nvGraphicFramePr>
           <p:cNvPr id="69" name="Chart 68"/>
@@ -7570,87 +7394,6 @@
           </a:p>
         </p:txBody>
       </p:sp>
-      <p:sp>
-        <p:nvSpPr>
-          <p:cNvPr id="76" name="TextBox 75"/>
-          <p:cNvSpPr txBox="1"/>
-          <p:nvPr/>
-        </p:nvSpPr>
-        <p:spPr>
-          <a:xfrm>
-            <a:off x="20269200" y="17854930"/>
-            <a:ext cx="8496300" cy="2554545"/>
-          </a:xfrm>
-          <a:prstGeom prst="rect">
-            <a:avLst/>
-          </a:prstGeom>
-          <a:noFill/>
-          <a:ln w="63500">
-            <a:solidFill>
-              <a:schemeClr val="tx1"/>
-            </a:solidFill>
-          </a:ln>
-        </p:spPr>
-        <p:txBody>
-          <a:bodyPr wrap="square" rtlCol="0">
-            <a:spAutoFit/>
-          </a:bodyPr>
-          <a:lstStyle/>
-          <a:p>
-            <a:pPr>
-              <a:buFont typeface="Arial" pitchFamily="34" charset="0"/>
-              <a:buChar char="•"/>
-            </a:pPr>
-            <a:r>
-              <a:rPr lang="en-ZA" sz="2000" dirty="0" smtClean="0"/>
-              <a:t> Numerical referencing performs poorly on less complex pages but has greater </a:t>
-            </a:r>
-          </a:p>
-          <a:p>
-            <a:r>
-              <a:rPr lang="en-ZA" sz="2000" dirty="0" smtClean="0"/>
-              <a:t>   performance than spoken link names on more complex pages.</a:t>
-            </a:r>
-          </a:p>
-          <a:p>
-            <a:endParaRPr lang="en-ZA" sz="2000" dirty="0" smtClean="0"/>
-          </a:p>
-          <a:p>
-            <a:pPr>
-              <a:buFont typeface="Arial" pitchFamily="34" charset="0"/>
-              <a:buChar char="•"/>
-            </a:pPr>
-            <a:r>
-              <a:rPr lang="en-ZA" sz="2000" dirty="0" smtClean="0"/>
-              <a:t> Numerical referencing is preferred on smaller pages but has no preferential </a:t>
-            </a:r>
-          </a:p>
-          <a:p>
-            <a:r>
-              <a:rPr lang="en-ZA" sz="2000" dirty="0" smtClean="0"/>
-              <a:t>  advantage over spoken link names on more complex pages.</a:t>
-            </a:r>
-          </a:p>
-          <a:p>
-            <a:endParaRPr lang="en-ZA" sz="2000" dirty="0" smtClean="0"/>
-          </a:p>
-          <a:p>
-            <a:pPr>
-              <a:buFont typeface="Arial" pitchFamily="34" charset="0"/>
-              <a:buChar char="•"/>
-            </a:pPr>
-            <a:r>
-              <a:rPr lang="en-ZA" sz="2000" dirty="0" smtClean="0"/>
-              <a:t> Age and gender have significant affects on voice recognition performance. </a:t>
-            </a:r>
-          </a:p>
-          <a:p>
-            <a:endParaRPr lang="en-ZA" sz="2000" dirty="0">
-              <a:latin typeface="Bookman Old Style" pitchFamily="18" charset="0"/>
-            </a:endParaRPr>
-          </a:p>
-        </p:txBody>
-      </p:sp>
       <p:graphicFrame>
         <p:nvGraphicFramePr>
           <p:cNvPr id="66" name="Chart 65"/>
@@ -7933,11 +7676,236 @@
           </a:p>
         </p:txBody>
       </p:sp>
+      <p:sp>
+        <p:nvSpPr>
+          <p:cNvPr id="37" name="Rectangle 36"/>
+          <p:cNvSpPr/>
+          <p:nvPr/>
+        </p:nvSpPr>
+        <p:spPr>
+          <a:xfrm>
+            <a:off x="20256500" y="16822421"/>
+            <a:ext cx="8470900" cy="1016000"/>
+          </a:xfrm>
+          <a:prstGeom prst="rect">
+            <a:avLst/>
+          </a:prstGeom>
+          <a:solidFill>
+            <a:srgbClr val="00B050"/>
+          </a:solidFill>
+        </p:spPr>
+        <p:style>
+          <a:lnRef idx="2">
+            <a:schemeClr val="accent1">
+              <a:shade val="50000"/>
+            </a:schemeClr>
+          </a:lnRef>
+          <a:fillRef idx="1">
+            <a:schemeClr val="accent1"/>
+          </a:fillRef>
+          <a:effectRef idx="0">
+            <a:schemeClr val="accent1"/>
+          </a:effectRef>
+          <a:fontRef idx="minor">
+            <a:schemeClr val="lt1"/>
+          </a:fontRef>
+        </p:style>
+        <p:txBody>
+          <a:bodyPr rtlCol="0" anchor="ctr"/>
+          <a:lstStyle/>
+          <a:p>
+            <a:pPr algn="ctr"/>
+            <a:endParaRPr lang="en-GB"/>
+          </a:p>
+        </p:txBody>
+      </p:sp>
+      <p:sp>
+        <p:nvSpPr>
+          <p:cNvPr id="38" name="TextBox 37"/>
+          <p:cNvSpPr txBox="1"/>
+          <p:nvPr/>
+        </p:nvSpPr>
+        <p:spPr>
+          <a:xfrm>
+            <a:off x="20521627" y="16943411"/>
+            <a:ext cx="7927986" cy="769441"/>
+          </a:xfrm>
+          <a:prstGeom prst="rect">
+            <a:avLst/>
+          </a:prstGeom>
+          <a:solidFill>
+            <a:schemeClr val="tx1"/>
+          </a:solidFill>
+        </p:spPr>
+        <p:txBody>
+          <a:bodyPr wrap="square" rtlCol="0">
+            <a:spAutoFit/>
+          </a:bodyPr>
+          <a:lstStyle/>
+          <a:p>
+            <a:pPr algn="ctr"/>
+            <a:r>
+              <a:rPr lang="en-ZA" sz="4400" b="1" dirty="0" smtClean="0">
+                <a:solidFill>
+                  <a:schemeClr val="bg1"/>
+                </a:solidFill>
+                <a:latin typeface="Verdana" pitchFamily="34" charset="0"/>
+                <a:ea typeface="Verdana" pitchFamily="34" charset="0"/>
+                <a:cs typeface="Verdana" pitchFamily="34" charset="0"/>
+              </a:rPr>
+              <a:t>Conclusion</a:t>
+            </a:r>
+            <a:endParaRPr lang="en-GB" sz="4400" b="1" dirty="0">
+              <a:solidFill>
+                <a:schemeClr val="bg1"/>
+              </a:solidFill>
+              <a:latin typeface="Verdana" pitchFamily="34" charset="0"/>
+              <a:ea typeface="Verdana" pitchFamily="34" charset="0"/>
+              <a:cs typeface="Verdana" pitchFamily="34" charset="0"/>
+            </a:endParaRPr>
+          </a:p>
+        </p:txBody>
+      </p:sp>
+      <p:sp>
+        <p:nvSpPr>
+          <p:cNvPr id="4" name="TextBox 3"/>
+          <p:cNvSpPr txBox="1"/>
+          <p:nvPr/>
+        </p:nvSpPr>
+        <p:spPr>
+          <a:xfrm>
+            <a:off x="4060159" y="1006448"/>
+            <a:ext cx="21804347" cy="2554545"/>
+          </a:xfrm>
+          <a:prstGeom prst="rect">
+            <a:avLst/>
+          </a:prstGeom>
+          <a:noFill/>
+          <a:ln w="25400" cap="sq" cmpd="sng">
+            <a:noFill/>
+          </a:ln>
+          <a:effectLst>
+            <a:outerShdw blurRad="50800" dist="50800" dir="5400000" algn="ctr" rotWithShape="0">
+              <a:schemeClr val="bg1"/>
+            </a:outerShdw>
+          </a:effectLst>
+        </p:spPr>
+        <p:txBody>
+          <a:bodyPr wrap="square" rtlCol="0">
+            <a:spAutoFit/>
+          </a:bodyPr>
+          <a:lstStyle/>
+          <a:p>
+            <a:pPr algn="ctr"/>
+            <a:r>
+              <a:rPr lang="en-ZA" sz="8000" b="1" dirty="0" smtClean="0">
+                <a:latin typeface="Verdana" pitchFamily="34" charset="0"/>
+                <a:ea typeface="Verdana" pitchFamily="34" charset="0"/>
+                <a:cs typeface="Verdana" pitchFamily="34" charset="0"/>
+              </a:rPr>
+              <a:t>An investigation into voice-controlled web browsing for the elderly</a:t>
+            </a:r>
+            <a:endParaRPr lang="en-GB" sz="8000" b="1" dirty="0">
+              <a:latin typeface="Verdana" pitchFamily="34" charset="0"/>
+              <a:ea typeface="Verdana" pitchFamily="34" charset="0"/>
+              <a:cs typeface="Verdana" pitchFamily="34" charset="0"/>
+            </a:endParaRPr>
+          </a:p>
+        </p:txBody>
+      </p:sp>
+      <p:sp>
+        <p:nvSpPr>
+          <p:cNvPr id="76" name="TextBox 75"/>
+          <p:cNvSpPr txBox="1"/>
+          <p:nvPr/>
+        </p:nvSpPr>
+        <p:spPr>
+          <a:xfrm>
+            <a:off x="20269200" y="17854930"/>
+            <a:ext cx="8496300" cy="2554545"/>
+          </a:xfrm>
+          <a:prstGeom prst="rect">
+            <a:avLst/>
+          </a:prstGeom>
+          <a:noFill/>
+          <a:ln w="63500">
+            <a:solidFill>
+              <a:schemeClr val="tx1"/>
+            </a:solidFill>
+          </a:ln>
+        </p:spPr>
+        <p:txBody>
+          <a:bodyPr wrap="square" rtlCol="0">
+            <a:spAutoFit/>
+          </a:bodyPr>
+          <a:lstStyle/>
+          <a:p>
+            <a:pPr>
+              <a:buFont typeface="Arial" pitchFamily="34" charset="0"/>
+              <a:buChar char="•"/>
+            </a:pPr>
+            <a:r>
+              <a:rPr lang="en-ZA" sz="2000" dirty="0" smtClean="0"/>
+              <a:t> Numerical referencing performs poorly on less complex pages but has greater </a:t>
+            </a:r>
+          </a:p>
+          <a:p>
+            <a:r>
+              <a:rPr lang="en-ZA" sz="2000" dirty="0" smtClean="0"/>
+              <a:t>   performance than spoken link names on more complex pages.</a:t>
+            </a:r>
+          </a:p>
+          <a:p>
+            <a:endParaRPr lang="en-ZA" sz="2000" dirty="0" smtClean="0"/>
+          </a:p>
+          <a:p>
+            <a:pPr>
+              <a:buFont typeface="Arial" pitchFamily="34" charset="0"/>
+              <a:buChar char="•"/>
+            </a:pPr>
+            <a:r>
+              <a:rPr lang="en-ZA" sz="2000" dirty="0" smtClean="0"/>
+              <a:t> Numerical referencing is preferred on smaller pages but has no preferential </a:t>
+            </a:r>
+          </a:p>
+          <a:p>
+            <a:r>
+              <a:rPr lang="en-ZA" sz="2000" dirty="0" smtClean="0"/>
+              <a:t>  advantage over spoken link names on more complex pages.</a:t>
+            </a:r>
+          </a:p>
+          <a:p>
+            <a:endParaRPr lang="en-ZA" sz="2000" dirty="0" smtClean="0"/>
+          </a:p>
+          <a:p>
+            <a:pPr>
+              <a:buFont typeface="Arial" pitchFamily="34" charset="0"/>
+              <a:buChar char="•"/>
+            </a:pPr>
+            <a:r>
+              <a:rPr lang="en-ZA" sz="2000" dirty="0" smtClean="0"/>
+              <a:t> Age and gender have significant affects on voice recognition performance. </a:t>
+            </a:r>
+          </a:p>
+          <a:p>
+            <a:endParaRPr lang="en-ZA" sz="2000" dirty="0">
+              <a:latin typeface="Bookman Old Style" pitchFamily="18" charset="0"/>
+            </a:endParaRPr>
+          </a:p>
+        </p:txBody>
+      </p:sp>
     </p:spTree>
   </p:cSld>
   <p:clrMapOvr>
     <a:masterClrMapping/>
   </p:clrMapOvr>
+  <p:timing>
+    <p:tnLst>
+      <p:par>
+        <p:cTn id="1" dur="indefinite" restart="never" nodeType="tmRoot"/>
+      </p:par>
+    </p:tnLst>
+  </p:timing>
 </p:sld>
 </file>
 

</xml_diff>

<commit_message>
My report version added. And new results included.
</commit_message>
<xml_diff>
--- a/Open day poster/After headphones watermark/poster display.pptx
+++ b/Open day poster/After headphones watermark/poster display.pptx
@@ -113,7 +113,7 @@
 <file path=ppt/charts/chart1.xml><?xml version="1.0" encoding="utf-8"?>
 <c:chartSpace xmlns:c="http://schemas.openxmlformats.org/drawingml/2006/chart" xmlns:a="http://schemas.openxmlformats.org/drawingml/2006/main" xmlns:r="http://schemas.openxmlformats.org/officeDocument/2006/relationships">
   <c:date1904 val="1"/>
-  <c:lang val="en-ZA"/>
+  <c:lang val="en-GB"/>
   <c:style val="10"/>
   <c:chart>
     <c:title>
@@ -145,8 +145,8 @@
         <c:manualLayout>
           <c:xMode val="edge"/>
           <c:yMode val="edge"/>
-          <c:x val="0.14452601779439689"/>
-          <c:y val="2.0834876286051126E-2"/>
+          <c:x val="0.14452601779439692"/>
+          <c:y val="2.0834876286051136E-2"/>
         </c:manualLayout>
       </c:layout>
     </c:title>
@@ -223,7 +223,7 @@
 <file path=ppt/charts/chart10.xml><?xml version="1.0" encoding="utf-8"?>
 <c:chartSpace xmlns:c="http://schemas.openxmlformats.org/drawingml/2006/chart" xmlns:a="http://schemas.openxmlformats.org/drawingml/2006/main" xmlns:r="http://schemas.openxmlformats.org/officeDocument/2006/relationships">
   <c:date1904 val="1"/>
-  <c:lang val="en-ZA"/>
+  <c:lang val="en-GB"/>
   <c:chart>
     <c:title>
       <c:tx>
@@ -306,12 +306,12 @@
           </c:val>
         </c:ser>
         <c:shape val="box"/>
-        <c:axId val="59021952"/>
-        <c:axId val="63566592"/>
+        <c:axId val="92810240"/>
+        <c:axId val="94467200"/>
         <c:axId val="0"/>
       </c:bar3DChart>
       <c:catAx>
-        <c:axId val="59021952"/>
+        <c:axId val="92810240"/>
         <c:scaling>
           <c:orientation val="minMax"/>
         </c:scaling>
@@ -346,14 +346,14 @@
             <a:endParaRPr lang="en-US"/>
           </a:p>
         </c:txPr>
-        <c:crossAx val="63566592"/>
+        <c:crossAx val="94467200"/>
         <c:crosses val="autoZero"/>
         <c:auto val="1"/>
         <c:lblAlgn val="ctr"/>
         <c:lblOffset val="100"/>
       </c:catAx>
       <c:valAx>
-        <c:axId val="63566592"/>
+        <c:axId val="94467200"/>
         <c:scaling>
           <c:orientation val="minMax"/>
         </c:scaling>
@@ -389,7 +389,7 @@
             <a:endParaRPr lang="en-US"/>
           </a:p>
         </c:txPr>
-        <c:crossAx val="59021952"/>
+        <c:crossAx val="92810240"/>
         <c:crosses val="autoZero"/>
         <c:crossBetween val="between"/>
       </c:valAx>
@@ -404,7 +404,7 @@
 <file path=ppt/charts/chart2.xml><?xml version="1.0" encoding="utf-8"?>
 <c:chartSpace xmlns:c="http://schemas.openxmlformats.org/drawingml/2006/chart" xmlns:a="http://schemas.openxmlformats.org/drawingml/2006/main" xmlns:r="http://schemas.openxmlformats.org/officeDocument/2006/relationships">
   <c:date1904 val="1"/>
-  <c:lang val="en-ZA"/>
+  <c:lang val="en-GB"/>
   <c:style val="10"/>
   <c:chart>
     <c:title>
@@ -449,7 +449,7 @@
               <c:layout>
                 <c:manualLayout>
                   <c:x val="0.27605293041055495"/>
-                  <c:y val="0.1195302715027597"/>
+                  <c:y val="0.11953027150275972"/>
                 </c:manualLayout>
               </c:layout>
               <c:showCatName val="1"/>
@@ -520,7 +520,7 @@
 <file path=ppt/charts/chart3.xml><?xml version="1.0" encoding="utf-8"?>
 <c:chartSpace xmlns:c="http://schemas.openxmlformats.org/drawingml/2006/chart" xmlns:a="http://schemas.openxmlformats.org/drawingml/2006/main" xmlns:r="http://schemas.openxmlformats.org/officeDocument/2006/relationships">
   <c:date1904 val="1"/>
-  <c:lang val="en-ZA"/>
+  <c:lang val="en-GB"/>
   <c:style val="10"/>
   <c:chart>
     <c:title>
@@ -589,7 +589,7 @@
 <file path=ppt/charts/chart4.xml><?xml version="1.0" encoding="utf-8"?>
 <c:chartSpace xmlns:c="http://schemas.openxmlformats.org/drawingml/2006/chart" xmlns:a="http://schemas.openxmlformats.org/drawingml/2006/main" xmlns:r="http://schemas.openxmlformats.org/officeDocument/2006/relationships">
   <c:date1904 val="1"/>
-  <c:lang val="en-ZA"/>
+  <c:lang val="en-GB"/>
   <c:style val="10"/>
   <c:chart>
     <c:title>
@@ -621,8 +621,8 @@
         <c:manualLayout>
           <c:xMode val="edge"/>
           <c:yMode val="edge"/>
-          <c:x val="0.11513428389018958"/>
-          <c:y val="2.3524559175266212E-2"/>
+          <c:x val="0.11513428389018961"/>
+          <c:y val="2.3524559175266201E-2"/>
         </c:manualLayout>
       </c:layout>
     </c:title>
@@ -699,7 +699,7 @@
 <file path=ppt/charts/chart5.xml><?xml version="1.0" encoding="utf-8"?>
 <c:chartSpace xmlns:c="http://schemas.openxmlformats.org/drawingml/2006/chart" xmlns:a="http://schemas.openxmlformats.org/drawingml/2006/main" xmlns:r="http://schemas.openxmlformats.org/officeDocument/2006/relationships">
   <c:date1904 val="1"/>
-  <c:lang val="en-ZA"/>
+  <c:lang val="en-GB"/>
   <c:style val="10"/>
   <c:chart>
     <c:title>
@@ -732,7 +732,7 @@
           <c:xMode val="edge"/>
           <c:yMode val="edge"/>
           <c:x val="0.12208054061086078"/>
-          <c:y val="8.9635814801467054E-2"/>
+          <c:y val="8.9635814801467067E-2"/>
         </c:manualLayout>
       </c:layout>
     </c:title>
@@ -812,7 +812,7 @@
 <file path=ppt/charts/chart6.xml><?xml version="1.0" encoding="utf-8"?>
 <c:chartSpace xmlns:c="http://schemas.openxmlformats.org/drawingml/2006/chart" xmlns:a="http://schemas.openxmlformats.org/drawingml/2006/main" xmlns:r="http://schemas.openxmlformats.org/officeDocument/2006/relationships">
   <c:date1904 val="1"/>
-  <c:lang val="en-ZA"/>
+  <c:lang val="en-GB"/>
   <c:chart>
     <c:title>
       <c:tx>
@@ -948,12 +948,12 @@
         <c:gapWidth val="55"/>
         <c:gapDepth val="55"/>
         <c:shape val="box"/>
-        <c:axId val="63152512"/>
-        <c:axId val="63154048"/>
+        <c:axId val="94376704"/>
+        <c:axId val="94378240"/>
         <c:axId val="0"/>
       </c:bar3DChart>
       <c:catAx>
-        <c:axId val="63152512"/>
+        <c:axId val="94376704"/>
         <c:scaling>
           <c:orientation val="minMax"/>
         </c:scaling>
@@ -970,14 +970,14 @@
             <a:endParaRPr lang="en-US"/>
           </a:p>
         </c:txPr>
-        <c:crossAx val="63154048"/>
+        <c:crossAx val="94378240"/>
         <c:crosses val="autoZero"/>
         <c:auto val="1"/>
         <c:lblAlgn val="ctr"/>
         <c:lblOffset val="100"/>
       </c:catAx>
       <c:valAx>
-        <c:axId val="63154048"/>
+        <c:axId val="94378240"/>
         <c:scaling>
           <c:orientation val="minMax"/>
         </c:scaling>
@@ -996,7 +996,7 @@
             <a:endParaRPr lang="en-US"/>
           </a:p>
         </c:txPr>
-        <c:crossAx val="63152512"/>
+        <c:crossAx val="94376704"/>
         <c:crosses val="autoZero"/>
         <c:crossBetween val="between"/>
       </c:valAx>
@@ -1024,7 +1024,7 @@
 <file path=ppt/charts/chart7.xml><?xml version="1.0" encoding="utf-8"?>
 <c:chartSpace xmlns:c="http://schemas.openxmlformats.org/drawingml/2006/chart" xmlns:a="http://schemas.openxmlformats.org/drawingml/2006/main" xmlns:r="http://schemas.openxmlformats.org/officeDocument/2006/relationships">
   <c:date1904 val="1"/>
-  <c:lang val="en-ZA"/>
+  <c:lang val="en-GB"/>
   <c:chart>
     <c:title>
       <c:tx>
@@ -1186,12 +1186,12 @@
         <c:gapWidth val="55"/>
         <c:gapDepth val="55"/>
         <c:shape val="box"/>
-        <c:axId val="63192448"/>
-        <c:axId val="63194240"/>
+        <c:axId val="94416896"/>
+        <c:axId val="94418432"/>
         <c:axId val="0"/>
       </c:bar3DChart>
       <c:catAx>
-        <c:axId val="63192448"/>
+        <c:axId val="94416896"/>
         <c:scaling>
           <c:orientation val="minMax"/>
         </c:scaling>
@@ -1208,14 +1208,14 @@
             <a:endParaRPr lang="en-US"/>
           </a:p>
         </c:txPr>
-        <c:crossAx val="63194240"/>
+        <c:crossAx val="94418432"/>
         <c:crosses val="autoZero"/>
         <c:auto val="1"/>
         <c:lblAlgn val="ctr"/>
         <c:lblOffset val="100"/>
       </c:catAx>
       <c:valAx>
-        <c:axId val="63194240"/>
+        <c:axId val="94418432"/>
         <c:scaling>
           <c:orientation val="minMax"/>
         </c:scaling>
@@ -1234,7 +1234,7 @@
             <a:endParaRPr lang="en-US"/>
           </a:p>
         </c:txPr>
-        <c:crossAx val="63192448"/>
+        <c:crossAx val="94416896"/>
         <c:crosses val="autoZero"/>
         <c:crossBetween val="between"/>
       </c:valAx>
@@ -1262,7 +1262,7 @@
 <file path=ppt/charts/chart8.xml><?xml version="1.0" encoding="utf-8"?>
 <c:chartSpace xmlns:c="http://schemas.openxmlformats.org/drawingml/2006/chart" xmlns:a="http://schemas.openxmlformats.org/drawingml/2006/main" xmlns:r="http://schemas.openxmlformats.org/officeDocument/2006/relationships">
   <c:date1904 val="1"/>
-  <c:lang val="en-ZA"/>
+  <c:lang val="en-GB"/>
   <c:chart>
     <c:title>
       <c:tx>
@@ -1296,9 +1296,9 @@
           <c:xMode val="edge"/>
           <c:yMode val="edge"/>
           <c:x val="0.28345765434775438"/>
-          <c:y val="0.377595666783691"/>
+          <c:y val="0.37759566678369105"/>
           <c:w val="0.65291566794737865"/>
-          <c:h val="0.44736696925623276"/>
+          <c:h val="0.44736696925623287"/>
         </c:manualLayout>
       </c:layout>
       <c:bar3DChart>
@@ -1457,12 +1457,12 @@
         <c:gapWidth val="55"/>
         <c:gapDepth val="55"/>
         <c:shape val="box"/>
-        <c:axId val="63507072"/>
-        <c:axId val="63512960"/>
+        <c:axId val="94522368"/>
+        <c:axId val="94528256"/>
         <c:axId val="0"/>
       </c:bar3DChart>
       <c:catAx>
-        <c:axId val="63507072"/>
+        <c:axId val="94522368"/>
         <c:scaling>
           <c:orientation val="minMax"/>
         </c:scaling>
@@ -1479,14 +1479,14 @@
             <a:endParaRPr lang="en-US"/>
           </a:p>
         </c:txPr>
-        <c:crossAx val="63512960"/>
+        <c:crossAx val="94528256"/>
         <c:crosses val="autoZero"/>
         <c:auto val="1"/>
         <c:lblAlgn val="ctr"/>
         <c:lblOffset val="100"/>
       </c:catAx>
       <c:valAx>
-        <c:axId val="63512960"/>
+        <c:axId val="94528256"/>
         <c:scaling>
           <c:orientation val="minMax"/>
         </c:scaling>
@@ -1505,7 +1505,7 @@
             <a:endParaRPr lang="en-US"/>
           </a:p>
         </c:txPr>
-        <c:crossAx val="63507072"/>
+        <c:crossAx val="94522368"/>
         <c:crosses val="autoZero"/>
         <c:crossBetween val="between"/>
       </c:valAx>
@@ -1533,7 +1533,7 @@
 <file path=ppt/charts/chart9.xml><?xml version="1.0" encoding="utf-8"?>
 <c:chartSpace xmlns:c="http://schemas.openxmlformats.org/drawingml/2006/chart" xmlns:a="http://schemas.openxmlformats.org/drawingml/2006/main" xmlns:r="http://schemas.openxmlformats.org/officeDocument/2006/relationships">
   <c:date1904 val="1"/>
-  <c:lang val="en-ZA"/>
+  <c:lang val="en-GB"/>
   <c:chart>
     <c:title>
       <c:tx>
@@ -1662,12 +1662,12 @@
         <c:gapWidth val="55"/>
         <c:gapDepth val="55"/>
         <c:shape val="box"/>
-        <c:axId val="63530112"/>
-        <c:axId val="63531648"/>
+        <c:axId val="94565888"/>
+        <c:axId val="94567424"/>
         <c:axId val="0"/>
       </c:bar3DChart>
       <c:catAx>
-        <c:axId val="63530112"/>
+        <c:axId val="94565888"/>
         <c:scaling>
           <c:orientation val="minMax"/>
         </c:scaling>
@@ -1685,14 +1685,14 @@
             <a:endParaRPr lang="en-US"/>
           </a:p>
         </c:txPr>
-        <c:crossAx val="63531648"/>
+        <c:crossAx val="94567424"/>
         <c:crosses val="autoZero"/>
         <c:auto val="1"/>
         <c:lblAlgn val="ctr"/>
         <c:lblOffset val="100"/>
       </c:catAx>
       <c:valAx>
-        <c:axId val="63531648"/>
+        <c:axId val="94567424"/>
         <c:scaling>
           <c:orientation val="minMax"/>
         </c:scaling>
@@ -1711,7 +1711,7 @@
             <a:endParaRPr lang="en-US"/>
           </a:p>
         </c:txPr>
-        <c:crossAx val="63530112"/>
+        <c:crossAx val="94565888"/>
         <c:crosses val="autoZero"/>
         <c:crossBetween val="between"/>
       </c:valAx>
@@ -5225,49 +5225,7 @@
               <a:rPr lang="en-ZA" sz="2000" dirty="0" smtClean="0">
                 <a:latin typeface="Bookman Old Style" pitchFamily="18" charset="0"/>
               </a:rPr>
-              <a:t>The investigation narrowed down the scope of computer usage to web-browsing. The techniques </a:t>
-            </a:r>
-            <a:r>
-              <a:rPr lang="en-ZA" sz="2000" dirty="0" smtClean="0">
-                <a:latin typeface="Bookman Old Style" pitchFamily="18" charset="0"/>
-              </a:rPr>
-              <a:t>seen to make </a:t>
-            </a:r>
-            <a:r>
-              <a:rPr lang="en-ZA" sz="2000" dirty="0" smtClean="0">
-                <a:latin typeface="Bookman Old Style" pitchFamily="18" charset="0"/>
-              </a:rPr>
-              <a:t>web-browsing simpler can be </a:t>
-            </a:r>
-            <a:r>
-              <a:rPr lang="en-ZA" sz="2000" dirty="0" smtClean="0">
-                <a:latin typeface="Bookman Old Style" pitchFamily="18" charset="0"/>
-              </a:rPr>
-              <a:t>extended to </a:t>
-            </a:r>
-            <a:r>
-              <a:rPr lang="en-ZA" sz="2000" dirty="0" smtClean="0">
-                <a:latin typeface="Bookman Old Style" pitchFamily="18" charset="0"/>
-              </a:rPr>
-              <a:t>make computers </a:t>
-            </a:r>
-            <a:r>
-              <a:rPr lang="en-ZA" sz="2000" dirty="0" smtClean="0">
-                <a:latin typeface="Bookman Old Style" pitchFamily="18" charset="0"/>
-              </a:rPr>
-              <a:t>generally more </a:t>
-            </a:r>
-            <a:r>
-              <a:rPr lang="en-ZA" sz="2000" dirty="0" smtClean="0">
-                <a:latin typeface="Bookman Old Style" pitchFamily="18" charset="0"/>
-              </a:rPr>
-              <a:t>usable for the </a:t>
-            </a:r>
-            <a:r>
-              <a:rPr lang="en-ZA" sz="2000" dirty="0" smtClean="0">
-                <a:latin typeface="Bookman Old Style" pitchFamily="18" charset="0"/>
-              </a:rPr>
-              <a:t>elderly.</a:t>
+              <a:t>The investigation narrowed down the scope of computer usage to web-browsing. The techniques seen to make web-browsing simpler can be extended to make computers generally more usable for the elderly.</a:t>
             </a:r>
             <a:r>
               <a:rPr lang="en-GB" sz="2000" dirty="0" smtClean="0">
@@ -5279,19 +5237,7 @@
               <a:rPr lang="en-ZA" sz="2000" dirty="0" smtClean="0">
                 <a:latin typeface="Bookman Old Style" pitchFamily="18" charset="0"/>
               </a:rPr>
-              <a:t>Voice recognition was perceived as one of these </a:t>
-            </a:r>
-            <a:r>
-              <a:rPr lang="en-ZA" sz="2000" dirty="0" smtClean="0">
-                <a:latin typeface="Bookman Old Style" pitchFamily="18" charset="0"/>
-              </a:rPr>
-              <a:t>techniques. </a:t>
-            </a:r>
-            <a:r>
-              <a:rPr lang="en-ZA" sz="2000" dirty="0" smtClean="0">
-                <a:latin typeface="Bookman Old Style" pitchFamily="18" charset="0"/>
-              </a:rPr>
-              <a:t>Thus methods of voice referencing and visual annotations were specifically investigated.</a:t>
+              <a:t>Voice recognition was perceived as one of these techniques. Thus methods of voice referencing and visual annotations were specifically investigated.</a:t>
             </a:r>
           </a:p>
           <a:p>
@@ -5318,31 +5264,7 @@
               <a:rPr lang="en-ZA" sz="2000" dirty="0" smtClean="0">
                 <a:latin typeface="Bookman Old Style" pitchFamily="18" charset="0"/>
               </a:rPr>
-              <a:t>Determine which </a:t>
-            </a:r>
-            <a:r>
-              <a:rPr lang="en-ZA" sz="2000" dirty="0" smtClean="0">
-                <a:latin typeface="Bookman Old Style" pitchFamily="18" charset="0"/>
-              </a:rPr>
-              <a:t>of two </a:t>
-            </a:r>
-            <a:r>
-              <a:rPr lang="en-ZA" sz="2000" dirty="0" smtClean="0">
-                <a:latin typeface="Bookman Old Style" pitchFamily="18" charset="0"/>
-              </a:rPr>
-              <a:t>voice referencing techniques perform better as a means of referencing links (accuracy). The referencing  techniques </a:t>
-            </a:r>
-            <a:r>
-              <a:rPr lang="en-ZA" sz="2000" dirty="0" smtClean="0">
-                <a:latin typeface="Bookman Old Style" pitchFamily="18" charset="0"/>
-              </a:rPr>
-              <a:t> used are</a:t>
-            </a:r>
-            <a:r>
-              <a:rPr lang="en-ZA" sz="2000" dirty="0" smtClean="0">
-                <a:latin typeface="Bookman Old Style" pitchFamily="18" charset="0"/>
-              </a:rPr>
-              <a:t>:</a:t>
+              <a:t>Determine which of two voice referencing techniques perform better as a means of referencing links (accuracy). The referencing  techniques  used are:</a:t>
             </a:r>
             <a:endParaRPr lang="en-GB" sz="2000" dirty="0" smtClean="0">
               <a:latin typeface="Bookman Old Style" pitchFamily="18" charset="0"/>
@@ -5911,17 +5833,8 @@
               <a:rPr lang="en-GB" sz="2000" dirty="0" smtClean="0">
                 <a:latin typeface="Bookman Old Style" pitchFamily="18" charset="0"/>
               </a:rPr>
-              <a:t>A facsimile of a news website was designed. Numerical and link name referencing styles were applied to the website to investigate the performance of these techniques on a more complex web application. </a:t>
-            </a:r>
-            <a:r>
-              <a:rPr lang="en-GB" sz="2000" dirty="0" smtClean="0">
-                <a:latin typeface="Bookman Old Style" pitchFamily="18" charset="0"/>
-              </a:rPr>
-              <a:t>The preferred feedback techniques (highlighting and verbal feedback) were also incorporated into the site. Additional usage questions were also posed. </a:t>
-            </a:r>
-            <a:endParaRPr lang="en-GB" sz="2000" dirty="0" smtClean="0">
-              <a:latin typeface="Bookman Old Style" pitchFamily="18" charset="0"/>
-            </a:endParaRPr>
+              <a:t>A facsimile of a news website was designed. Numerical and link name referencing styles were applied to the website to investigate the performance of these techniques on a more complex web application. The preferred feedback techniques (highlighting and verbal feedback) were also incorporated into the site. Additional usage questions were also posed. </a:t>
+            </a:r>
           </a:p>
           <a:p>
             <a:pPr algn="just"/>
@@ -6028,23 +5941,8 @@
               <a:rPr lang="en-GB" sz="2000" dirty="0" smtClean="0">
                 <a:latin typeface="Bookman Old Style" pitchFamily="18" charset="0"/>
               </a:rPr>
-              <a:t>  require  internet </a:t>
-            </a:r>
-            <a:r>
-              <a:rPr lang="en-GB" sz="2000" dirty="0" smtClean="0">
-                <a:latin typeface="Bookman Old Style" pitchFamily="18" charset="0"/>
-              </a:rPr>
-              <a:t>access to </a:t>
-            </a:r>
-            <a:r>
-              <a:rPr lang="en-GB" sz="2000" smtClean="0">
-                <a:latin typeface="Bookman Old Style" pitchFamily="18" charset="0"/>
-              </a:rPr>
-              <a:t>process commands. </a:t>
-            </a:r>
-            <a:endParaRPr lang="en-GB" sz="2000" dirty="0" smtClean="0">
-              <a:latin typeface="Bookman Old Style" pitchFamily="18" charset="0"/>
-            </a:endParaRPr>
+              <a:t>  require  internet access to process commands. </a:t>
+            </a:r>
           </a:p>
         </p:txBody>
       </p:sp>
@@ -6114,19 +6012,7 @@
               <a:rPr lang="en-GB" sz="2000" dirty="0" smtClean="0">
                 <a:latin typeface="Bookman Old Style" pitchFamily="18" charset="0"/>
               </a:rPr>
-              <a:t> However the results in figure 2 </a:t>
-            </a:r>
-            <a:r>
-              <a:rPr lang="en-GB" sz="2000" dirty="0" smtClean="0">
-                <a:latin typeface="Bookman Old Style" pitchFamily="18" charset="0"/>
-              </a:rPr>
-              <a:t>indicates </a:t>
-            </a:r>
-            <a:r>
-              <a:rPr lang="en-GB" sz="2000" dirty="0" smtClean="0">
-                <a:latin typeface="Bookman Old Style" pitchFamily="18" charset="0"/>
-              </a:rPr>
-              <a:t>that link name </a:t>
+              <a:t> However the results in figure 2 indicates that link name </a:t>
             </a:r>
           </a:p>
           <a:p>
@@ -6147,19 +6033,7 @@
               <a:rPr lang="en-GB" sz="2000" dirty="0" smtClean="0">
                 <a:latin typeface="Bookman Old Style" pitchFamily="18" charset="0"/>
               </a:rPr>
-              <a:t> Figure 3 </a:t>
-            </a:r>
-            <a:r>
-              <a:rPr lang="en-GB" sz="2000" dirty="0" smtClean="0">
-                <a:latin typeface="Bookman Old Style" pitchFamily="18" charset="0"/>
-              </a:rPr>
-              <a:t>indicates </a:t>
-            </a:r>
-            <a:r>
-              <a:rPr lang="en-GB" sz="2000" dirty="0" smtClean="0">
-                <a:latin typeface="Bookman Old Style" pitchFamily="18" charset="0"/>
-              </a:rPr>
-              <a:t>that users prefer link highlighting as a visual</a:t>
+              <a:t> Figure 3 indicates that users prefer link highlighting as a visual</a:t>
             </a:r>
           </a:p>
           <a:p>
@@ -6423,55 +6297,7 @@
               <a:rPr lang="en-GB" sz="2000" dirty="0" smtClean="0">
                 <a:latin typeface="Bookman Old Style" pitchFamily="18" charset="0"/>
               </a:rPr>
-              <a:t>The large error rate observed for numerical referencing (see Analysis) in </a:t>
-            </a:r>
-            <a:r>
-              <a:rPr lang="en-GB" sz="2000" dirty="0" smtClean="0">
-                <a:latin typeface="Bookman Old Style" pitchFamily="18" charset="0"/>
-              </a:rPr>
-              <a:t>I</a:t>
-            </a:r>
-            <a:r>
-              <a:rPr lang="en-GB" sz="2000" dirty="0" smtClean="0">
-                <a:latin typeface="Bookman Old Style" pitchFamily="18" charset="0"/>
-              </a:rPr>
-              <a:t>teration </a:t>
-            </a:r>
-            <a:r>
-              <a:rPr lang="en-GB" sz="2000" dirty="0" smtClean="0">
-                <a:latin typeface="Bookman Old Style" pitchFamily="18" charset="0"/>
-              </a:rPr>
-              <a:t>1</a:t>
-            </a:r>
-            <a:r>
-              <a:rPr lang="en-GB" sz="2000" dirty="0" smtClean="0">
-                <a:latin typeface="Bookman Old Style" pitchFamily="18" charset="0"/>
-              </a:rPr>
-              <a:t> </a:t>
-            </a:r>
-            <a:r>
-              <a:rPr lang="en-GB" sz="2000" dirty="0" smtClean="0">
-                <a:latin typeface="Bookman Old Style" pitchFamily="18" charset="0"/>
-              </a:rPr>
-              <a:t>could largely be </a:t>
-            </a:r>
-            <a:r>
-              <a:rPr lang="en-GB" sz="2000" dirty="0" smtClean="0">
-                <a:latin typeface="Bookman Old Style" pitchFamily="18" charset="0"/>
-              </a:rPr>
-              <a:t>attributed</a:t>
-            </a:r>
-            <a:r>
-              <a:rPr lang="en-GB" sz="2000" dirty="0" smtClean="0">
-                <a:latin typeface="Bookman Old Style" pitchFamily="18" charset="0"/>
-              </a:rPr>
-              <a:t> </a:t>
-            </a:r>
-            <a:r>
-              <a:rPr lang="en-GB" sz="2000" dirty="0" smtClean="0">
-                <a:latin typeface="Bookman Old Style" pitchFamily="18" charset="0"/>
-              </a:rPr>
-              <a:t>to the user </a:t>
+              <a:t>The large error rate observed for numerical referencing (see Analysis) in Iteration 1 could largely be attributed to the user </a:t>
             </a:r>
             <a:r>
               <a:rPr lang="en-GB" sz="2000" dirty="0" err="1" smtClean="0">
@@ -6483,19 +6309,7 @@
               <a:rPr lang="en-GB" sz="2000" dirty="0" smtClean="0">
                 <a:latin typeface="Bookman Old Style" pitchFamily="18" charset="0"/>
               </a:rPr>
-              <a:t> </a:t>
-            </a:r>
-            <a:r>
-              <a:rPr lang="en-GB" sz="2000" dirty="0" smtClean="0">
-                <a:latin typeface="Bookman Old Style" pitchFamily="18" charset="0"/>
-              </a:rPr>
-              <a:t>period. For this reason, </a:t>
-            </a:r>
-            <a:r>
-              <a:rPr lang="en-GB" sz="2000" dirty="0" smtClean="0">
-                <a:latin typeface="Bookman Old Style" pitchFamily="18" charset="0"/>
-              </a:rPr>
-              <a:t>the test was restructured. Feedback techniques were eliminated and a warm-up period (tutorial) for both numerical and spoken link name testing was provided.</a:t>
+              <a:t> period. For this reason, the test was restructured. Feedback techniques were eliminated and a warm-up period (tutorial) for both numerical and spoken link name testing was provided.</a:t>
             </a:r>
           </a:p>
           <a:p>
@@ -7871,7 +7685,7 @@
         <p:spPr>
           <a:xfrm>
             <a:off x="20256500" y="16822421"/>
-            <a:ext cx="8470900" cy="1016000"/>
+            <a:ext cx="8525330" cy="984316"/>
           </a:xfrm>
           <a:prstGeom prst="rect">
             <a:avLst/>
@@ -7913,7 +7727,7 @@
         </p:nvSpPr>
         <p:spPr>
           <a:xfrm>
-            <a:off x="20521627" y="16943411"/>
+            <a:off x="20559823" y="16943411"/>
             <a:ext cx="7927986" cy="769441"/>
           </a:xfrm>
           <a:prstGeom prst="rect">

</xml_diff>